<commit_message>
Story 1 completed: created CustomerTest test (TDD) and DOMAIN classes(Customer, CustomerDto, Address) and mapper (CustomerMapper).  Created REPOSITORY class CustomerRepository.
</commit_message>
<xml_diff>
--- a/src/main/resources/UML.pptx
+++ b/src/main/resources/UML.pptx
@@ -3589,7 +3589,7 @@
         </p:nvSpPr>
         <p:spPr>
           <a:xfrm>
-            <a:off x="295828" y="2276867"/>
+            <a:off x="304126" y="4190938"/>
             <a:ext cx="2080470" cy="343950"/>
           </a:xfrm>
           <a:prstGeom prst="rect">
@@ -3638,7 +3638,7 @@
         </p:nvSpPr>
         <p:spPr>
           <a:xfrm>
-            <a:off x="295828" y="2658567"/>
+            <a:off x="295828" y="4600331"/>
             <a:ext cx="2080470" cy="1749106"/>
           </a:xfrm>
           <a:prstGeom prst="rect">
@@ -5045,6 +5045,1325 @@
               <a:rPr lang="en-US" dirty="0"/>
               <a:t>Create customer account</a:t>
             </a:r>
+          </a:p>
+        </p:txBody>
+      </p:sp>
+      <p:sp>
+        <p:nvSpPr>
+          <p:cNvPr id="49" name="Rectangle 48">
+            <a:extLst>
+              <a:ext uri="{FF2B5EF4-FFF2-40B4-BE49-F238E27FC236}">
+                <a16:creationId xmlns:a16="http://schemas.microsoft.com/office/drawing/2014/main" id="{F8611230-E082-4592-882B-DB1E4404382D}"/>
+              </a:ext>
+            </a:extLst>
+          </p:cNvPr>
+          <p:cNvSpPr/>
+          <p:nvPr/>
+        </p:nvSpPr>
+        <p:spPr>
+          <a:xfrm>
+            <a:off x="274040" y="2281334"/>
+            <a:ext cx="2080470" cy="343949"/>
+          </a:xfrm>
+          <a:prstGeom prst="rect">
+            <a:avLst/>
+          </a:prstGeom>
+          <a:solidFill>
+            <a:schemeClr val="tx2"/>
+          </a:solidFill>
+        </p:spPr>
+        <p:style>
+          <a:lnRef idx="2">
+            <a:schemeClr val="accent1">
+              <a:shade val="50000"/>
+            </a:schemeClr>
+          </a:lnRef>
+          <a:fillRef idx="1">
+            <a:schemeClr val="accent1"/>
+          </a:fillRef>
+          <a:effectRef idx="0">
+            <a:schemeClr val="accent1"/>
+          </a:effectRef>
+          <a:fontRef idx="minor">
+            <a:schemeClr val="lt1"/>
+          </a:fontRef>
+        </p:style>
+        <p:txBody>
+          <a:bodyPr rtlCol="0" anchor="ctr"/>
+          <a:lstStyle/>
+          <a:p>
+            <a:pPr algn="ctr"/>
+            <a:r>
+              <a:rPr lang="en-US" b="1" dirty="0"/>
+              <a:t>Address</a:t>
+            </a:r>
+            <a:endParaRPr lang="en-US" dirty="0"/>
+          </a:p>
+        </p:txBody>
+      </p:sp>
+      <p:sp>
+        <p:nvSpPr>
+          <p:cNvPr id="50" name="Rectangle 49">
+            <a:extLst>
+              <a:ext uri="{FF2B5EF4-FFF2-40B4-BE49-F238E27FC236}">
+                <a16:creationId xmlns:a16="http://schemas.microsoft.com/office/drawing/2014/main" id="{1F0D7775-91D0-416E-8221-7700E8882982}"/>
+              </a:ext>
+            </a:extLst>
+          </p:cNvPr>
+          <p:cNvSpPr/>
+          <p:nvPr/>
+        </p:nvSpPr>
+        <p:spPr>
+          <a:xfrm>
+            <a:off x="274039" y="2625284"/>
+            <a:ext cx="2080470" cy="323291"/>
+          </a:xfrm>
+          <a:prstGeom prst="rect">
+            <a:avLst/>
+          </a:prstGeom>
+          <a:solidFill>
+            <a:srgbClr val="92D050"/>
+          </a:solidFill>
+        </p:spPr>
+        <p:style>
+          <a:lnRef idx="2">
+            <a:schemeClr val="accent1">
+              <a:shade val="50000"/>
+            </a:schemeClr>
+          </a:lnRef>
+          <a:fillRef idx="1">
+            <a:schemeClr val="accent1"/>
+          </a:fillRef>
+          <a:effectRef idx="0">
+            <a:schemeClr val="accent1"/>
+          </a:effectRef>
+          <a:fontRef idx="minor">
+            <a:schemeClr val="lt1"/>
+          </a:fontRef>
+        </p:style>
+        <p:txBody>
+          <a:bodyPr rtlCol="0" anchor="ctr"/>
+          <a:lstStyle/>
+          <a:p>
+            <a:r>
+              <a:rPr lang="en-US" sz="1400" dirty="0"/>
+              <a:t>Address</a:t>
+            </a:r>
+          </a:p>
+        </p:txBody>
+      </p:sp>
+      <p:sp>
+        <p:nvSpPr>
+          <p:cNvPr id="8" name="Ellipse 7">
+            <a:extLst>
+              <a:ext uri="{FF2B5EF4-FFF2-40B4-BE49-F238E27FC236}">
+                <a16:creationId xmlns:a16="http://schemas.microsoft.com/office/drawing/2014/main" id="{4E4B763F-55D3-41E7-B339-32FD7535F420}"/>
+              </a:ext>
+            </a:extLst>
+          </p:cNvPr>
+          <p:cNvSpPr/>
+          <p:nvPr/>
+        </p:nvSpPr>
+        <p:spPr>
+          <a:xfrm>
+            <a:off x="2099949" y="6065484"/>
+            <a:ext cx="276349" cy="276349"/>
+          </a:xfrm>
+          <a:prstGeom prst="ellipse">
+            <a:avLst/>
+          </a:prstGeom>
+          <a:solidFill>
+            <a:srgbClr val="FFFF00"/>
+          </a:solidFill>
+          <a:ln>
+            <a:noFill/>
+          </a:ln>
+        </p:spPr>
+        <p:style>
+          <a:lnRef idx="2">
+            <a:schemeClr val="accent1">
+              <a:shade val="50000"/>
+            </a:schemeClr>
+          </a:lnRef>
+          <a:fillRef idx="1">
+            <a:schemeClr val="accent1"/>
+          </a:fillRef>
+          <a:effectRef idx="0">
+            <a:schemeClr val="accent1"/>
+          </a:effectRef>
+          <a:fontRef idx="minor">
+            <a:schemeClr val="lt1"/>
+          </a:fontRef>
+        </p:style>
+        <p:txBody>
+          <a:bodyPr rtlCol="0" anchor="ctr"/>
+          <a:lstStyle/>
+          <a:p>
+            <a:pPr algn="ctr"/>
+            <a:endParaRPr lang="fr-BE" dirty="0"/>
+          </a:p>
+        </p:txBody>
+      </p:sp>
+      <p:sp>
+        <p:nvSpPr>
+          <p:cNvPr id="58" name="Ellipse 57">
+            <a:extLst>
+              <a:ext uri="{FF2B5EF4-FFF2-40B4-BE49-F238E27FC236}">
+                <a16:creationId xmlns:a16="http://schemas.microsoft.com/office/drawing/2014/main" id="{E2C0B42C-EC05-4076-AB0E-7EDB76EED8A7}"/>
+              </a:ext>
+            </a:extLst>
+          </p:cNvPr>
+          <p:cNvSpPr/>
+          <p:nvPr/>
+        </p:nvSpPr>
+        <p:spPr>
+          <a:xfrm>
+            <a:off x="4474158" y="5218373"/>
+            <a:ext cx="276349" cy="276349"/>
+          </a:xfrm>
+          <a:prstGeom prst="ellipse">
+            <a:avLst/>
+          </a:prstGeom>
+          <a:solidFill>
+            <a:srgbClr val="FFFF00"/>
+          </a:solidFill>
+          <a:ln>
+            <a:noFill/>
+          </a:ln>
+        </p:spPr>
+        <p:style>
+          <a:lnRef idx="2">
+            <a:schemeClr val="accent1">
+              <a:shade val="50000"/>
+            </a:schemeClr>
+          </a:lnRef>
+          <a:fillRef idx="1">
+            <a:schemeClr val="accent1"/>
+          </a:fillRef>
+          <a:effectRef idx="0">
+            <a:schemeClr val="accent1"/>
+          </a:effectRef>
+          <a:fontRef idx="minor">
+            <a:schemeClr val="lt1"/>
+          </a:fontRef>
+        </p:style>
+        <p:txBody>
+          <a:bodyPr rtlCol="0" anchor="ctr"/>
+          <a:lstStyle/>
+          <a:p>
+            <a:pPr algn="ctr"/>
+            <a:endParaRPr lang="fr-BE" dirty="0"/>
+          </a:p>
+        </p:txBody>
+      </p:sp>
+      <p:sp>
+        <p:nvSpPr>
+          <p:cNvPr id="59" name="Ellipse 58">
+            <a:extLst>
+              <a:ext uri="{FF2B5EF4-FFF2-40B4-BE49-F238E27FC236}">
+                <a16:creationId xmlns:a16="http://schemas.microsoft.com/office/drawing/2014/main" id="{CE0DE86E-F2C1-48F1-8D32-8CE5815FA486}"/>
+              </a:ext>
+            </a:extLst>
+          </p:cNvPr>
+          <p:cNvSpPr/>
+          <p:nvPr/>
+        </p:nvSpPr>
+        <p:spPr>
+          <a:xfrm>
+            <a:off x="6834283" y="5128315"/>
+            <a:ext cx="276349" cy="276349"/>
+          </a:xfrm>
+          <a:prstGeom prst="ellipse">
+            <a:avLst/>
+          </a:prstGeom>
+          <a:solidFill>
+            <a:srgbClr val="FFFF00"/>
+          </a:solidFill>
+          <a:ln>
+            <a:noFill/>
+          </a:ln>
+        </p:spPr>
+        <p:style>
+          <a:lnRef idx="2">
+            <a:schemeClr val="accent1">
+              <a:shade val="50000"/>
+            </a:schemeClr>
+          </a:lnRef>
+          <a:fillRef idx="1">
+            <a:schemeClr val="accent1"/>
+          </a:fillRef>
+          <a:effectRef idx="0">
+            <a:schemeClr val="accent1"/>
+          </a:effectRef>
+          <a:fontRef idx="minor">
+            <a:schemeClr val="lt1"/>
+          </a:fontRef>
+        </p:style>
+        <p:txBody>
+          <a:bodyPr rtlCol="0" anchor="ctr"/>
+          <a:lstStyle/>
+          <a:p>
+            <a:pPr algn="ctr"/>
+            <a:endParaRPr lang="fr-BE" dirty="0"/>
+          </a:p>
+        </p:txBody>
+      </p:sp>
+      <p:sp>
+        <p:nvSpPr>
+          <p:cNvPr id="60" name="Ellipse 59">
+            <a:extLst>
+              <a:ext uri="{FF2B5EF4-FFF2-40B4-BE49-F238E27FC236}">
+                <a16:creationId xmlns:a16="http://schemas.microsoft.com/office/drawing/2014/main" id="{CCA57AC6-B1AC-4BF3-83E9-B6B78C3E2AC0}"/>
+              </a:ext>
+            </a:extLst>
+          </p:cNvPr>
+          <p:cNvSpPr/>
+          <p:nvPr/>
+        </p:nvSpPr>
+        <p:spPr>
+          <a:xfrm>
+            <a:off x="9227519" y="5740937"/>
+            <a:ext cx="276349" cy="276349"/>
+          </a:xfrm>
+          <a:prstGeom prst="ellipse">
+            <a:avLst/>
+          </a:prstGeom>
+          <a:solidFill>
+            <a:srgbClr val="FFFF00"/>
+          </a:solidFill>
+          <a:ln>
+            <a:noFill/>
+          </a:ln>
+        </p:spPr>
+        <p:style>
+          <a:lnRef idx="2">
+            <a:schemeClr val="accent1">
+              <a:shade val="50000"/>
+            </a:schemeClr>
+          </a:lnRef>
+          <a:fillRef idx="1">
+            <a:schemeClr val="accent1"/>
+          </a:fillRef>
+          <a:effectRef idx="0">
+            <a:schemeClr val="accent1"/>
+          </a:effectRef>
+          <a:fontRef idx="minor">
+            <a:schemeClr val="lt1"/>
+          </a:fontRef>
+        </p:style>
+        <p:txBody>
+          <a:bodyPr rtlCol="0" anchor="ctr"/>
+          <a:lstStyle/>
+          <a:p>
+            <a:pPr algn="ctr"/>
+            <a:endParaRPr lang="fr-BE" dirty="0"/>
+          </a:p>
+        </p:txBody>
+      </p:sp>
+      <p:sp>
+        <p:nvSpPr>
+          <p:cNvPr id="61" name="Ellipse 60">
+            <a:extLst>
+              <a:ext uri="{FF2B5EF4-FFF2-40B4-BE49-F238E27FC236}">
+                <a16:creationId xmlns:a16="http://schemas.microsoft.com/office/drawing/2014/main" id="{06287A81-FA07-4ED9-96D5-65FB6FAC891A}"/>
+              </a:ext>
+            </a:extLst>
+          </p:cNvPr>
+          <p:cNvSpPr/>
+          <p:nvPr/>
+        </p:nvSpPr>
+        <p:spPr>
+          <a:xfrm>
+            <a:off x="2857874" y="5727605"/>
+            <a:ext cx="276349" cy="276349"/>
+          </a:xfrm>
+          <a:prstGeom prst="ellipse">
+            <a:avLst/>
+          </a:prstGeom>
+          <a:solidFill>
+            <a:srgbClr val="FFFF00"/>
+          </a:solidFill>
+          <a:ln>
+            <a:noFill/>
+          </a:ln>
+        </p:spPr>
+        <p:style>
+          <a:lnRef idx="2">
+            <a:schemeClr val="accent1">
+              <a:shade val="50000"/>
+            </a:schemeClr>
+          </a:lnRef>
+          <a:fillRef idx="1">
+            <a:schemeClr val="accent1"/>
+          </a:fillRef>
+          <a:effectRef idx="0">
+            <a:schemeClr val="accent1"/>
+          </a:effectRef>
+          <a:fontRef idx="minor">
+            <a:schemeClr val="lt1"/>
+          </a:fontRef>
+        </p:style>
+        <p:txBody>
+          <a:bodyPr rtlCol="0" anchor="ctr"/>
+          <a:lstStyle/>
+          <a:p>
+            <a:pPr algn="ctr"/>
+            <a:endParaRPr lang="fr-BE" dirty="0"/>
+          </a:p>
+        </p:txBody>
+      </p:sp>
+      <p:sp>
+        <p:nvSpPr>
+          <p:cNvPr id="14" name="ZoneTexte 13">
+            <a:extLst>
+              <a:ext uri="{FF2B5EF4-FFF2-40B4-BE49-F238E27FC236}">
+                <a16:creationId xmlns:a16="http://schemas.microsoft.com/office/drawing/2014/main" id="{81F22EF7-6E96-4E5C-A3E0-9DE3EBBB79AC}"/>
+              </a:ext>
+            </a:extLst>
+          </p:cNvPr>
+          <p:cNvSpPr txBox="1"/>
+          <p:nvPr/>
+        </p:nvSpPr>
+        <p:spPr>
+          <a:xfrm>
+            <a:off x="3112784" y="5681113"/>
+            <a:ext cx="2474845" cy="369332"/>
+          </a:xfrm>
+          <a:prstGeom prst="rect">
+            <a:avLst/>
+          </a:prstGeom>
+          <a:noFill/>
+        </p:spPr>
+        <p:txBody>
+          <a:bodyPr wrap="none" rtlCol="0">
+            <a:spAutoFit/>
+          </a:bodyPr>
+          <a:lstStyle/>
+          <a:p>
+            <a:r>
+              <a:rPr lang="fr-BE" dirty="0"/>
+              <a:t>Service / Controller (api)</a:t>
+            </a:r>
+          </a:p>
+        </p:txBody>
+      </p:sp>
+      <p:sp>
+        <p:nvSpPr>
+          <p:cNvPr id="62" name="Ellipse 61">
+            <a:extLst>
+              <a:ext uri="{FF2B5EF4-FFF2-40B4-BE49-F238E27FC236}">
+                <a16:creationId xmlns:a16="http://schemas.microsoft.com/office/drawing/2014/main" id="{F26775BC-02A2-44EB-B3CE-4320C066FFD8}"/>
+              </a:ext>
+            </a:extLst>
+          </p:cNvPr>
+          <p:cNvSpPr/>
+          <p:nvPr/>
+        </p:nvSpPr>
+        <p:spPr>
+          <a:xfrm>
+            <a:off x="2857874" y="6073088"/>
+            <a:ext cx="276349" cy="276349"/>
+          </a:xfrm>
+          <a:prstGeom prst="ellipse">
+            <a:avLst/>
+          </a:prstGeom>
+          <a:solidFill>
+            <a:srgbClr val="00B0F0"/>
+          </a:solidFill>
+          <a:ln>
+            <a:noFill/>
+          </a:ln>
+        </p:spPr>
+        <p:style>
+          <a:lnRef idx="2">
+            <a:schemeClr val="accent1">
+              <a:shade val="50000"/>
+            </a:schemeClr>
+          </a:lnRef>
+          <a:fillRef idx="1">
+            <a:schemeClr val="accent1"/>
+          </a:fillRef>
+          <a:effectRef idx="0">
+            <a:schemeClr val="accent1"/>
+          </a:effectRef>
+          <a:fontRef idx="minor">
+            <a:schemeClr val="lt1"/>
+          </a:fontRef>
+        </p:style>
+        <p:txBody>
+          <a:bodyPr rtlCol="0" anchor="ctr"/>
+          <a:lstStyle/>
+          <a:p>
+            <a:pPr algn="ctr"/>
+            <a:endParaRPr lang="fr-BE" dirty="0"/>
+          </a:p>
+        </p:txBody>
+      </p:sp>
+      <p:sp>
+        <p:nvSpPr>
+          <p:cNvPr id="63" name="Ellipse 62">
+            <a:extLst>
+              <a:ext uri="{FF2B5EF4-FFF2-40B4-BE49-F238E27FC236}">
+                <a16:creationId xmlns:a16="http://schemas.microsoft.com/office/drawing/2014/main" id="{1F232061-863B-4ADC-A70F-35EE5625A07C}"/>
+              </a:ext>
+            </a:extLst>
+          </p:cNvPr>
+          <p:cNvSpPr/>
+          <p:nvPr/>
+        </p:nvSpPr>
+        <p:spPr>
+          <a:xfrm>
+            <a:off x="2061376" y="1676309"/>
+            <a:ext cx="276349" cy="276349"/>
+          </a:xfrm>
+          <a:prstGeom prst="ellipse">
+            <a:avLst/>
+          </a:prstGeom>
+          <a:solidFill>
+            <a:srgbClr val="00B0F0"/>
+          </a:solidFill>
+          <a:ln>
+            <a:noFill/>
+          </a:ln>
+        </p:spPr>
+        <p:style>
+          <a:lnRef idx="2">
+            <a:schemeClr val="accent1">
+              <a:shade val="50000"/>
+            </a:schemeClr>
+          </a:lnRef>
+          <a:fillRef idx="1">
+            <a:schemeClr val="accent1"/>
+          </a:fillRef>
+          <a:effectRef idx="0">
+            <a:schemeClr val="accent1"/>
+          </a:effectRef>
+          <a:fontRef idx="minor">
+            <a:schemeClr val="lt1"/>
+          </a:fontRef>
+        </p:style>
+        <p:txBody>
+          <a:bodyPr rtlCol="0" anchor="ctr"/>
+          <a:lstStyle/>
+          <a:p>
+            <a:pPr algn="ctr"/>
+            <a:endParaRPr lang="fr-BE" dirty="0"/>
+          </a:p>
+        </p:txBody>
+      </p:sp>
+      <p:sp>
+        <p:nvSpPr>
+          <p:cNvPr id="64" name="Ellipse 63">
+            <a:extLst>
+              <a:ext uri="{FF2B5EF4-FFF2-40B4-BE49-F238E27FC236}">
+                <a16:creationId xmlns:a16="http://schemas.microsoft.com/office/drawing/2014/main" id="{53405E06-9892-473A-9C4E-5E71CD7B7D47}"/>
+              </a:ext>
+            </a:extLst>
+          </p:cNvPr>
+          <p:cNvSpPr/>
+          <p:nvPr/>
+        </p:nvSpPr>
+        <p:spPr>
+          <a:xfrm>
+            <a:off x="4456578" y="1686531"/>
+            <a:ext cx="276349" cy="276349"/>
+          </a:xfrm>
+          <a:prstGeom prst="ellipse">
+            <a:avLst/>
+          </a:prstGeom>
+          <a:solidFill>
+            <a:srgbClr val="00B0F0"/>
+          </a:solidFill>
+          <a:ln>
+            <a:noFill/>
+          </a:ln>
+        </p:spPr>
+        <p:style>
+          <a:lnRef idx="2">
+            <a:schemeClr val="accent1">
+              <a:shade val="50000"/>
+            </a:schemeClr>
+          </a:lnRef>
+          <a:fillRef idx="1">
+            <a:schemeClr val="accent1"/>
+          </a:fillRef>
+          <a:effectRef idx="0">
+            <a:schemeClr val="accent1"/>
+          </a:effectRef>
+          <a:fontRef idx="minor">
+            <a:schemeClr val="lt1"/>
+          </a:fontRef>
+        </p:style>
+        <p:txBody>
+          <a:bodyPr rtlCol="0" anchor="ctr"/>
+          <a:lstStyle/>
+          <a:p>
+            <a:pPr algn="ctr"/>
+            <a:endParaRPr lang="fr-BE" dirty="0"/>
+          </a:p>
+        </p:txBody>
+      </p:sp>
+      <p:sp>
+        <p:nvSpPr>
+          <p:cNvPr id="65" name="Ellipse 64">
+            <a:extLst>
+              <a:ext uri="{FF2B5EF4-FFF2-40B4-BE49-F238E27FC236}">
+                <a16:creationId xmlns:a16="http://schemas.microsoft.com/office/drawing/2014/main" id="{1CC8F6AC-9592-4C15-B74A-D4DF9274CE2E}"/>
+              </a:ext>
+            </a:extLst>
+          </p:cNvPr>
+          <p:cNvSpPr/>
+          <p:nvPr/>
+        </p:nvSpPr>
+        <p:spPr>
+          <a:xfrm>
+            <a:off x="6817931" y="1705295"/>
+            <a:ext cx="276349" cy="276349"/>
+          </a:xfrm>
+          <a:prstGeom prst="ellipse">
+            <a:avLst/>
+          </a:prstGeom>
+          <a:solidFill>
+            <a:srgbClr val="00B0F0"/>
+          </a:solidFill>
+          <a:ln>
+            <a:noFill/>
+          </a:ln>
+        </p:spPr>
+        <p:style>
+          <a:lnRef idx="2">
+            <a:schemeClr val="accent1">
+              <a:shade val="50000"/>
+            </a:schemeClr>
+          </a:lnRef>
+          <a:fillRef idx="1">
+            <a:schemeClr val="accent1"/>
+          </a:fillRef>
+          <a:effectRef idx="0">
+            <a:schemeClr val="accent1"/>
+          </a:effectRef>
+          <a:fontRef idx="minor">
+            <a:schemeClr val="lt1"/>
+          </a:fontRef>
+        </p:style>
+        <p:txBody>
+          <a:bodyPr rtlCol="0" anchor="ctr"/>
+          <a:lstStyle/>
+          <a:p>
+            <a:pPr algn="ctr"/>
+            <a:endParaRPr lang="fr-BE" dirty="0"/>
+          </a:p>
+        </p:txBody>
+      </p:sp>
+      <p:sp>
+        <p:nvSpPr>
+          <p:cNvPr id="66" name="Ellipse 65">
+            <a:extLst>
+              <a:ext uri="{FF2B5EF4-FFF2-40B4-BE49-F238E27FC236}">
+                <a16:creationId xmlns:a16="http://schemas.microsoft.com/office/drawing/2014/main" id="{0CD573B7-B616-46B0-B694-FD7747A6D8E1}"/>
+              </a:ext>
+            </a:extLst>
+          </p:cNvPr>
+          <p:cNvSpPr/>
+          <p:nvPr/>
+        </p:nvSpPr>
+        <p:spPr>
+          <a:xfrm>
+            <a:off x="9175186" y="1688209"/>
+            <a:ext cx="276349" cy="276349"/>
+          </a:xfrm>
+          <a:prstGeom prst="ellipse">
+            <a:avLst/>
+          </a:prstGeom>
+          <a:solidFill>
+            <a:srgbClr val="00B0F0"/>
+          </a:solidFill>
+          <a:ln>
+            <a:noFill/>
+          </a:ln>
+        </p:spPr>
+        <p:style>
+          <a:lnRef idx="2">
+            <a:schemeClr val="accent1">
+              <a:shade val="50000"/>
+            </a:schemeClr>
+          </a:lnRef>
+          <a:fillRef idx="1">
+            <a:schemeClr val="accent1"/>
+          </a:fillRef>
+          <a:effectRef idx="0">
+            <a:schemeClr val="accent1"/>
+          </a:effectRef>
+          <a:fontRef idx="minor">
+            <a:schemeClr val="lt1"/>
+          </a:fontRef>
+        </p:style>
+        <p:txBody>
+          <a:bodyPr rtlCol="0" anchor="ctr"/>
+          <a:lstStyle/>
+          <a:p>
+            <a:pPr algn="ctr"/>
+            <a:endParaRPr lang="fr-BE" dirty="0"/>
+          </a:p>
+        </p:txBody>
+      </p:sp>
+      <p:sp>
+        <p:nvSpPr>
+          <p:cNvPr id="67" name="ZoneTexte 66">
+            <a:extLst>
+              <a:ext uri="{FF2B5EF4-FFF2-40B4-BE49-F238E27FC236}">
+                <a16:creationId xmlns:a16="http://schemas.microsoft.com/office/drawing/2014/main" id="{37F6B810-11DD-400F-AEEB-A05C4C68230E}"/>
+              </a:ext>
+            </a:extLst>
+          </p:cNvPr>
+          <p:cNvSpPr txBox="1"/>
+          <p:nvPr/>
+        </p:nvSpPr>
+        <p:spPr>
+          <a:xfrm>
+            <a:off x="3134453" y="6037830"/>
+            <a:ext cx="2119170" cy="369332"/>
+          </a:xfrm>
+          <a:prstGeom prst="rect">
+            <a:avLst/>
+          </a:prstGeom>
+          <a:noFill/>
+        </p:spPr>
+        <p:txBody>
+          <a:bodyPr wrap="none" rtlCol="0">
+            <a:spAutoFit/>
+          </a:bodyPr>
+          <a:lstStyle/>
+          <a:p>
+            <a:r>
+              <a:rPr lang="fr-BE" dirty="0"/>
+              <a:t>Domain / Repository</a:t>
+            </a:r>
+          </a:p>
+        </p:txBody>
+      </p:sp>
+      <p:sp>
+        <p:nvSpPr>
+          <p:cNvPr id="68" name="Ellipse 67">
+            <a:extLst>
+              <a:ext uri="{FF2B5EF4-FFF2-40B4-BE49-F238E27FC236}">
+                <a16:creationId xmlns:a16="http://schemas.microsoft.com/office/drawing/2014/main" id="{55993A40-F8DA-4933-85A9-6B2D71BE64CF}"/>
+              </a:ext>
+            </a:extLst>
+          </p:cNvPr>
+          <p:cNvSpPr/>
+          <p:nvPr/>
+        </p:nvSpPr>
+        <p:spPr>
+          <a:xfrm>
+            <a:off x="2020835" y="2676562"/>
+            <a:ext cx="276349" cy="276349"/>
+          </a:xfrm>
+          <a:prstGeom prst="ellipse">
+            <a:avLst/>
+          </a:prstGeom>
+          <a:solidFill>
+            <a:srgbClr val="00B0F0"/>
+          </a:solidFill>
+          <a:ln>
+            <a:noFill/>
+          </a:ln>
+        </p:spPr>
+        <p:style>
+          <a:lnRef idx="2">
+            <a:schemeClr val="accent1">
+              <a:shade val="50000"/>
+            </a:schemeClr>
+          </a:lnRef>
+          <a:fillRef idx="1">
+            <a:schemeClr val="accent1"/>
+          </a:fillRef>
+          <a:effectRef idx="0">
+            <a:schemeClr val="accent1"/>
+          </a:effectRef>
+          <a:fontRef idx="minor">
+            <a:schemeClr val="lt1"/>
+          </a:fontRef>
+        </p:style>
+        <p:txBody>
+          <a:bodyPr rtlCol="0" anchor="ctr"/>
+          <a:lstStyle/>
+          <a:p>
+            <a:pPr algn="ctr"/>
+            <a:endParaRPr lang="fr-BE" dirty="0"/>
+          </a:p>
+        </p:txBody>
+      </p:sp>
+      <p:sp>
+        <p:nvSpPr>
+          <p:cNvPr id="69" name="Ellipse 68">
+            <a:extLst>
+              <a:ext uri="{FF2B5EF4-FFF2-40B4-BE49-F238E27FC236}">
+                <a16:creationId xmlns:a16="http://schemas.microsoft.com/office/drawing/2014/main" id="{9FB40821-3272-4256-BA42-F9554F8F15B5}"/>
+              </a:ext>
+            </a:extLst>
+          </p:cNvPr>
+          <p:cNvSpPr/>
+          <p:nvPr/>
+        </p:nvSpPr>
+        <p:spPr>
+          <a:xfrm>
+            <a:off x="2159009" y="4045159"/>
+            <a:ext cx="276349" cy="276349"/>
+          </a:xfrm>
+          <a:prstGeom prst="ellipse">
+            <a:avLst/>
+          </a:prstGeom>
+          <a:solidFill>
+            <a:srgbClr val="00B0F0"/>
+          </a:solidFill>
+          <a:ln>
+            <a:noFill/>
+          </a:ln>
+        </p:spPr>
+        <p:style>
+          <a:lnRef idx="2">
+            <a:schemeClr val="accent1">
+              <a:shade val="50000"/>
+            </a:schemeClr>
+          </a:lnRef>
+          <a:fillRef idx="1">
+            <a:schemeClr val="accent1"/>
+          </a:fillRef>
+          <a:effectRef idx="0">
+            <a:schemeClr val="accent1"/>
+          </a:effectRef>
+          <a:fontRef idx="minor">
+            <a:schemeClr val="lt1"/>
+          </a:fontRef>
+        </p:style>
+        <p:txBody>
+          <a:bodyPr rtlCol="0" anchor="ctr"/>
+          <a:lstStyle/>
+          <a:p>
+            <a:pPr algn="ctr"/>
+            <a:endParaRPr lang="fr-BE" dirty="0"/>
+          </a:p>
+        </p:txBody>
+      </p:sp>
+      <p:sp>
+        <p:nvSpPr>
+          <p:cNvPr id="70" name="Ellipse 69">
+            <a:extLst>
+              <a:ext uri="{FF2B5EF4-FFF2-40B4-BE49-F238E27FC236}">
+                <a16:creationId xmlns:a16="http://schemas.microsoft.com/office/drawing/2014/main" id="{63675EE8-646A-4F81-92A5-BEC4162B3608}"/>
+              </a:ext>
+            </a:extLst>
+          </p:cNvPr>
+          <p:cNvSpPr/>
+          <p:nvPr/>
+        </p:nvSpPr>
+        <p:spPr>
+          <a:xfrm>
+            <a:off x="9323001" y="4784575"/>
+            <a:ext cx="276349" cy="276349"/>
+          </a:xfrm>
+          <a:prstGeom prst="ellipse">
+            <a:avLst/>
+          </a:prstGeom>
+          <a:solidFill>
+            <a:schemeClr val="bg2"/>
+          </a:solidFill>
+          <a:ln>
+            <a:noFill/>
+          </a:ln>
+        </p:spPr>
+        <p:style>
+          <a:lnRef idx="2">
+            <a:schemeClr val="accent1">
+              <a:shade val="50000"/>
+            </a:schemeClr>
+          </a:lnRef>
+          <a:fillRef idx="1">
+            <a:schemeClr val="accent1"/>
+          </a:fillRef>
+          <a:effectRef idx="0">
+            <a:schemeClr val="accent1"/>
+          </a:effectRef>
+          <a:fontRef idx="minor">
+            <a:schemeClr val="lt1"/>
+          </a:fontRef>
+        </p:style>
+        <p:txBody>
+          <a:bodyPr rtlCol="0" anchor="ctr"/>
+          <a:lstStyle/>
+          <a:p>
+            <a:pPr algn="ctr"/>
+            <a:endParaRPr lang="fr-BE" dirty="0"/>
+          </a:p>
+        </p:txBody>
+      </p:sp>
+      <p:sp>
+        <p:nvSpPr>
+          <p:cNvPr id="71" name="Ellipse 70">
+            <a:extLst>
+              <a:ext uri="{FF2B5EF4-FFF2-40B4-BE49-F238E27FC236}">
+                <a16:creationId xmlns:a16="http://schemas.microsoft.com/office/drawing/2014/main" id="{A27A7733-E5A0-4A42-BD0F-B7B611CB7C7A}"/>
+              </a:ext>
+            </a:extLst>
+          </p:cNvPr>
+          <p:cNvSpPr/>
+          <p:nvPr/>
+        </p:nvSpPr>
+        <p:spPr>
+          <a:xfrm>
+            <a:off x="9313360" y="2153629"/>
+            <a:ext cx="276349" cy="276349"/>
+          </a:xfrm>
+          <a:prstGeom prst="ellipse">
+            <a:avLst/>
+          </a:prstGeom>
+          <a:solidFill>
+            <a:srgbClr val="00B0F0"/>
+          </a:solidFill>
+          <a:ln>
+            <a:noFill/>
+          </a:ln>
+        </p:spPr>
+        <p:style>
+          <a:lnRef idx="2">
+            <a:schemeClr val="accent1">
+              <a:shade val="50000"/>
+            </a:schemeClr>
+          </a:lnRef>
+          <a:fillRef idx="1">
+            <a:schemeClr val="accent1"/>
+          </a:fillRef>
+          <a:effectRef idx="0">
+            <a:schemeClr val="accent1"/>
+          </a:effectRef>
+          <a:fontRef idx="minor">
+            <a:schemeClr val="lt1"/>
+          </a:fontRef>
+        </p:style>
+        <p:txBody>
+          <a:bodyPr rtlCol="0" anchor="ctr"/>
+          <a:lstStyle/>
+          <a:p>
+            <a:pPr algn="ctr"/>
+            <a:endParaRPr lang="fr-BE" dirty="0"/>
+          </a:p>
+        </p:txBody>
+      </p:sp>
+      <p:sp>
+        <p:nvSpPr>
+          <p:cNvPr id="72" name="Ellipse 71">
+            <a:extLst>
+              <a:ext uri="{FF2B5EF4-FFF2-40B4-BE49-F238E27FC236}">
+                <a16:creationId xmlns:a16="http://schemas.microsoft.com/office/drawing/2014/main" id="{116E6360-AED2-4230-8B0E-1BA188C88725}"/>
+              </a:ext>
+            </a:extLst>
+          </p:cNvPr>
+          <p:cNvSpPr/>
+          <p:nvPr/>
+        </p:nvSpPr>
+        <p:spPr>
+          <a:xfrm>
+            <a:off x="2857874" y="6476296"/>
+            <a:ext cx="276349" cy="276349"/>
+          </a:xfrm>
+          <a:prstGeom prst="ellipse">
+            <a:avLst/>
+          </a:prstGeom>
+          <a:solidFill>
+            <a:schemeClr val="bg2"/>
+          </a:solidFill>
+          <a:ln>
+            <a:noFill/>
+          </a:ln>
+        </p:spPr>
+        <p:style>
+          <a:lnRef idx="2">
+            <a:schemeClr val="accent1">
+              <a:shade val="50000"/>
+            </a:schemeClr>
+          </a:lnRef>
+          <a:fillRef idx="1">
+            <a:schemeClr val="accent1"/>
+          </a:fillRef>
+          <a:effectRef idx="0">
+            <a:schemeClr val="accent1"/>
+          </a:effectRef>
+          <a:fontRef idx="minor">
+            <a:schemeClr val="lt1"/>
+          </a:fontRef>
+        </p:style>
+        <p:txBody>
+          <a:bodyPr rtlCol="0" anchor="ctr"/>
+          <a:lstStyle/>
+          <a:p>
+            <a:pPr algn="ctr"/>
+            <a:endParaRPr lang="fr-BE" dirty="0"/>
+          </a:p>
+        </p:txBody>
+      </p:sp>
+      <p:sp>
+        <p:nvSpPr>
+          <p:cNvPr id="73" name="ZoneTexte 72">
+            <a:extLst>
+              <a:ext uri="{FF2B5EF4-FFF2-40B4-BE49-F238E27FC236}">
+                <a16:creationId xmlns:a16="http://schemas.microsoft.com/office/drawing/2014/main" id="{67C8E3F4-D387-48CE-8A8F-6123A4B20C9F}"/>
+              </a:ext>
+            </a:extLst>
+          </p:cNvPr>
+          <p:cNvSpPr txBox="1"/>
+          <p:nvPr/>
+        </p:nvSpPr>
+        <p:spPr>
+          <a:xfrm>
+            <a:off x="3112784" y="6441038"/>
+            <a:ext cx="2983445" cy="369332"/>
+          </a:xfrm>
+          <a:prstGeom prst="rect">
+            <a:avLst/>
+          </a:prstGeom>
+          <a:noFill/>
+        </p:spPr>
+        <p:txBody>
+          <a:bodyPr wrap="none" rtlCol="0">
+            <a:spAutoFit/>
+          </a:bodyPr>
+          <a:lstStyle/>
+          <a:p>
+            <a:r>
+              <a:rPr lang="en-US" dirty="0"/>
+              <a:t>Concept – no implementation</a:t>
+            </a:r>
+          </a:p>
+        </p:txBody>
+      </p:sp>
+      <p:sp>
+        <p:nvSpPr>
+          <p:cNvPr id="74" name="Ellipse 73">
+            <a:extLst>
+              <a:ext uri="{FF2B5EF4-FFF2-40B4-BE49-F238E27FC236}">
+                <a16:creationId xmlns:a16="http://schemas.microsoft.com/office/drawing/2014/main" id="{B350CEFB-C306-47EF-8D4B-EAA385275746}"/>
+              </a:ext>
+            </a:extLst>
+          </p:cNvPr>
+          <p:cNvSpPr/>
+          <p:nvPr/>
+        </p:nvSpPr>
+        <p:spPr>
+          <a:xfrm>
+            <a:off x="11624381" y="4118192"/>
+            <a:ext cx="276349" cy="276349"/>
+          </a:xfrm>
+          <a:prstGeom prst="ellipse">
+            <a:avLst/>
+          </a:prstGeom>
+          <a:solidFill>
+            <a:srgbClr val="92D050"/>
+          </a:solidFill>
+          <a:ln>
+            <a:noFill/>
+          </a:ln>
+        </p:spPr>
+        <p:style>
+          <a:lnRef idx="2">
+            <a:schemeClr val="accent1">
+              <a:shade val="50000"/>
+            </a:schemeClr>
+          </a:lnRef>
+          <a:fillRef idx="1">
+            <a:schemeClr val="accent1"/>
+          </a:fillRef>
+          <a:effectRef idx="0">
+            <a:schemeClr val="accent1"/>
+          </a:effectRef>
+          <a:fontRef idx="minor">
+            <a:schemeClr val="lt1"/>
+          </a:fontRef>
+        </p:style>
+        <p:txBody>
+          <a:bodyPr rtlCol="0" anchor="ctr"/>
+          <a:lstStyle/>
+          <a:p>
+            <a:pPr algn="ctr"/>
+            <a:endParaRPr lang="fr-BE" dirty="0"/>
+          </a:p>
+        </p:txBody>
+      </p:sp>
+      <p:sp>
+        <p:nvSpPr>
+          <p:cNvPr id="75" name="Ellipse 74">
+            <a:extLst>
+              <a:ext uri="{FF2B5EF4-FFF2-40B4-BE49-F238E27FC236}">
+                <a16:creationId xmlns:a16="http://schemas.microsoft.com/office/drawing/2014/main" id="{43E3FFC7-DFBD-4984-88DB-8E10B56F4879}"/>
+              </a:ext>
+            </a:extLst>
+          </p:cNvPr>
+          <p:cNvSpPr/>
+          <p:nvPr/>
+        </p:nvSpPr>
+        <p:spPr>
+          <a:xfrm>
+            <a:off x="11624381" y="5067180"/>
+            <a:ext cx="276349" cy="276349"/>
+          </a:xfrm>
+          <a:prstGeom prst="ellipse">
+            <a:avLst/>
+          </a:prstGeom>
+          <a:solidFill>
+            <a:srgbClr val="92D050"/>
+          </a:solidFill>
+          <a:ln>
+            <a:noFill/>
+          </a:ln>
+        </p:spPr>
+        <p:style>
+          <a:lnRef idx="2">
+            <a:schemeClr val="accent1">
+              <a:shade val="50000"/>
+            </a:schemeClr>
+          </a:lnRef>
+          <a:fillRef idx="1">
+            <a:schemeClr val="accent1"/>
+          </a:fillRef>
+          <a:effectRef idx="0">
+            <a:schemeClr val="accent1"/>
+          </a:effectRef>
+          <a:fontRef idx="minor">
+            <a:schemeClr val="lt1"/>
+          </a:fontRef>
+        </p:style>
+        <p:txBody>
+          <a:bodyPr rtlCol="0" anchor="ctr"/>
+          <a:lstStyle/>
+          <a:p>
+            <a:pPr algn="ctr"/>
+            <a:endParaRPr lang="fr-BE" dirty="0"/>
+          </a:p>
+        </p:txBody>
+      </p:sp>
+      <p:sp>
+        <p:nvSpPr>
+          <p:cNvPr id="76" name="Ellipse 75">
+            <a:extLst>
+              <a:ext uri="{FF2B5EF4-FFF2-40B4-BE49-F238E27FC236}">
+                <a16:creationId xmlns:a16="http://schemas.microsoft.com/office/drawing/2014/main" id="{82D02064-F01F-42CC-9F86-67F0E171CD4C}"/>
+              </a:ext>
+            </a:extLst>
+          </p:cNvPr>
+          <p:cNvSpPr/>
+          <p:nvPr/>
+        </p:nvSpPr>
+        <p:spPr>
+          <a:xfrm>
+            <a:off x="5783125" y="5727292"/>
+            <a:ext cx="276349" cy="276349"/>
+          </a:xfrm>
+          <a:prstGeom prst="ellipse">
+            <a:avLst/>
+          </a:prstGeom>
+          <a:solidFill>
+            <a:srgbClr val="92D050"/>
+          </a:solidFill>
+          <a:ln>
+            <a:noFill/>
+          </a:ln>
+        </p:spPr>
+        <p:style>
+          <a:lnRef idx="2">
+            <a:schemeClr val="accent1">
+              <a:shade val="50000"/>
+            </a:schemeClr>
+          </a:lnRef>
+          <a:fillRef idx="1">
+            <a:schemeClr val="accent1"/>
+          </a:fillRef>
+          <a:effectRef idx="0">
+            <a:schemeClr val="accent1"/>
+          </a:effectRef>
+          <a:fontRef idx="minor">
+            <a:schemeClr val="lt1"/>
+          </a:fontRef>
+        </p:style>
+        <p:txBody>
+          <a:bodyPr rtlCol="0" anchor="ctr"/>
+          <a:lstStyle/>
+          <a:p>
+            <a:pPr algn="ctr"/>
+            <a:endParaRPr lang="fr-BE" dirty="0"/>
+          </a:p>
+        </p:txBody>
+      </p:sp>
+      <p:sp>
+        <p:nvSpPr>
+          <p:cNvPr id="77" name="ZoneTexte 76">
+            <a:extLst>
+              <a:ext uri="{FF2B5EF4-FFF2-40B4-BE49-F238E27FC236}">
+                <a16:creationId xmlns:a16="http://schemas.microsoft.com/office/drawing/2014/main" id="{B568CE4D-F317-47FC-9979-758EBBDBE277}"/>
+              </a:ext>
+            </a:extLst>
+          </p:cNvPr>
+          <p:cNvSpPr txBox="1"/>
+          <p:nvPr/>
+        </p:nvSpPr>
+        <p:spPr>
+          <a:xfrm>
+            <a:off x="6011779" y="5697901"/>
+            <a:ext cx="1388156" cy="369332"/>
+          </a:xfrm>
+          <a:prstGeom prst="rect">
+            <a:avLst/>
+          </a:prstGeom>
+          <a:noFill/>
+        </p:spPr>
+        <p:txBody>
+          <a:bodyPr wrap="square">
+            <a:spAutoFit/>
+          </a:bodyPr>
+          <a:lstStyle/>
+          <a:p>
+            <a:r>
+              <a:rPr lang="en-US" dirty="0"/>
+              <a:t>Service only</a:t>
+            </a:r>
+          </a:p>
+        </p:txBody>
+      </p:sp>
+      <p:sp>
+        <p:nvSpPr>
+          <p:cNvPr id="78" name="Ellipse 77">
+            <a:extLst>
+              <a:ext uri="{FF2B5EF4-FFF2-40B4-BE49-F238E27FC236}">
+                <a16:creationId xmlns:a16="http://schemas.microsoft.com/office/drawing/2014/main" id="{931BAF90-9FFD-4ABA-916B-2352D68493C8}"/>
+              </a:ext>
+            </a:extLst>
+          </p:cNvPr>
+          <p:cNvSpPr/>
+          <p:nvPr/>
+        </p:nvSpPr>
+        <p:spPr>
+          <a:xfrm>
+            <a:off x="5783125" y="6116549"/>
+            <a:ext cx="276349" cy="276349"/>
+          </a:xfrm>
+          <a:prstGeom prst="ellipse">
+            <a:avLst/>
+          </a:prstGeom>
+          <a:solidFill>
+            <a:srgbClr val="FF0000"/>
+          </a:solidFill>
+          <a:ln>
+            <a:noFill/>
+          </a:ln>
+        </p:spPr>
+        <p:style>
+          <a:lnRef idx="2">
+            <a:schemeClr val="accent1">
+              <a:shade val="50000"/>
+            </a:schemeClr>
+          </a:lnRef>
+          <a:fillRef idx="1">
+            <a:schemeClr val="accent1"/>
+          </a:fillRef>
+          <a:effectRef idx="0">
+            <a:schemeClr val="accent1"/>
+          </a:effectRef>
+          <a:fontRef idx="minor">
+            <a:schemeClr val="lt1"/>
+          </a:fontRef>
+        </p:style>
+        <p:txBody>
+          <a:bodyPr rtlCol="0" anchor="ctr"/>
+          <a:lstStyle/>
+          <a:p>
+            <a:pPr algn="ctr"/>
+            <a:endParaRPr lang="fr-BE" dirty="0"/>
+          </a:p>
+        </p:txBody>
+      </p:sp>
+      <p:sp>
+        <p:nvSpPr>
+          <p:cNvPr id="79" name="ZoneTexte 78">
+            <a:extLst>
+              <a:ext uri="{FF2B5EF4-FFF2-40B4-BE49-F238E27FC236}">
+                <a16:creationId xmlns:a16="http://schemas.microsoft.com/office/drawing/2014/main" id="{EC63C5B0-96E4-4153-B94E-B5D8C75A6977}"/>
+              </a:ext>
+            </a:extLst>
+          </p:cNvPr>
+          <p:cNvSpPr txBox="1"/>
+          <p:nvPr/>
+        </p:nvSpPr>
+        <p:spPr>
+          <a:xfrm>
+            <a:off x="6023510" y="6071706"/>
+            <a:ext cx="1388156" cy="369332"/>
+          </a:xfrm>
+          <a:prstGeom prst="rect">
+            <a:avLst/>
+          </a:prstGeom>
+          <a:noFill/>
+        </p:spPr>
+        <p:txBody>
+          <a:bodyPr wrap="square">
+            <a:spAutoFit/>
+          </a:bodyPr>
+          <a:lstStyle/>
+          <a:p>
+            <a:r>
+              <a:rPr lang="en-US" dirty="0"/>
+              <a:t>Security</a:t>
+            </a:r>
+          </a:p>
+        </p:txBody>
+      </p:sp>
+      <p:sp>
+        <p:nvSpPr>
+          <p:cNvPr id="80" name="Ellipse 79">
+            <a:extLst>
+              <a:ext uri="{FF2B5EF4-FFF2-40B4-BE49-F238E27FC236}">
+                <a16:creationId xmlns:a16="http://schemas.microsoft.com/office/drawing/2014/main" id="{091EE02F-0C0D-4F72-ACF0-4DDB39FD0141}"/>
+              </a:ext>
+            </a:extLst>
+          </p:cNvPr>
+          <p:cNvSpPr/>
+          <p:nvPr/>
+        </p:nvSpPr>
+        <p:spPr>
+          <a:xfrm>
+            <a:off x="11613646" y="2948758"/>
+            <a:ext cx="276349" cy="276349"/>
+          </a:xfrm>
+          <a:prstGeom prst="ellipse">
+            <a:avLst/>
+          </a:prstGeom>
+          <a:solidFill>
+            <a:srgbClr val="00B0F0"/>
+          </a:solidFill>
+          <a:ln>
+            <a:noFill/>
+          </a:ln>
+        </p:spPr>
+        <p:style>
+          <a:lnRef idx="2">
+            <a:schemeClr val="accent1">
+              <a:shade val="50000"/>
+            </a:schemeClr>
+          </a:lnRef>
+          <a:fillRef idx="1">
+            <a:schemeClr val="accent1"/>
+          </a:fillRef>
+          <a:effectRef idx="0">
+            <a:schemeClr val="accent1"/>
+          </a:effectRef>
+          <a:fontRef idx="minor">
+            <a:schemeClr val="lt1"/>
+          </a:fontRef>
+        </p:style>
+        <p:txBody>
+          <a:bodyPr rtlCol="0" anchor="ctr"/>
+          <a:lstStyle/>
+          <a:p>
+            <a:pPr algn="ctr"/>
+            <a:endParaRPr lang="fr-BE" dirty="0"/>
           </a:p>
         </p:txBody>
       </p:sp>

</xml_diff>